<commit_message>
removed slides from Josh's deck and created new one
</commit_message>
<xml_diff>
--- a/Josh Slides.pptx
+++ b/Josh Slides.pptx
@@ -5,7 +5,7 @@
     <p:sldMasterId id="2147483648" r:id="rId1"/>
   </p:sldMasterIdLst>
   <p:notesMasterIdLst>
-    <p:notesMasterId r:id="rId11"/>
+    <p:notesMasterId r:id="rId8"/>
   </p:notesMasterIdLst>
   <p:sldIdLst>
     <p:sldId id="256" r:id="rId2"/>
@@ -14,9 +14,6 @@
     <p:sldId id="259" r:id="rId5"/>
     <p:sldId id="260" r:id="rId6"/>
     <p:sldId id="261" r:id="rId7"/>
-    <p:sldId id="262" r:id="rId8"/>
-    <p:sldId id="263" r:id="rId9"/>
-    <p:sldId id="264" r:id="rId10"/>
   </p:sldIdLst>
   <p:sldSz cx="12192000" cy="6858000"/>
   <p:notesSz cx="6858000" cy="9144000"/>
@@ -205,7 +202,7 @@
           <a:p>
             <a:fld id="{21EC824C-E48E-FA4D-A901-5E581957051E}" type="datetimeFigureOut">
               <a:rPr lang="en-US" smtClean="0"/>
-              <a:t>12/8/15</a:t>
+              <a:t>12/9/15</a:t>
             </a:fld>
             <a:endParaRPr lang="en-US"/>
           </a:p>
@@ -557,90 +554,6 @@
 </p:notes>
 </file>
 
-<file path=ppt/notesSlides/notesSlide2.xml><?xml version="1.0" encoding="utf-8"?>
-<p:notes xmlns:a="http://schemas.openxmlformats.org/drawingml/2006/main" xmlns:r="http://schemas.openxmlformats.org/officeDocument/2006/relationships" xmlns:p="http://schemas.openxmlformats.org/presentationml/2006/main">
-  <p:cSld>
-    <p:spTree>
-      <p:nvGrpSpPr>
-        <p:cNvPr id="1" name=""/>
-        <p:cNvGrpSpPr/>
-        <p:nvPr/>
-      </p:nvGrpSpPr>
-      <p:grpSpPr>
-        <a:xfrm>
-          <a:off x="0" y="0"/>
-          <a:ext cx="0" cy="0"/>
-          <a:chOff x="0" y="0"/>
-          <a:chExt cx="0" cy="0"/>
-        </a:xfrm>
-      </p:grpSpPr>
-      <p:sp>
-        <p:nvSpPr>
-          <p:cNvPr id="2" name="Slide Image Placeholder 1"/>
-          <p:cNvSpPr>
-            <a:spLocks noGrp="1" noRot="1" noChangeAspect="1"/>
-          </p:cNvSpPr>
-          <p:nvPr>
-            <p:ph type="sldImg"/>
-          </p:nvPr>
-        </p:nvSpPr>
-        <p:spPr/>
-      </p:sp>
-      <p:sp>
-        <p:nvSpPr>
-          <p:cNvPr id="3" name="Notes Placeholder 2"/>
-          <p:cNvSpPr>
-            <a:spLocks noGrp="1"/>
-          </p:cNvSpPr>
-          <p:nvPr>
-            <p:ph type="body" idx="1"/>
-          </p:nvPr>
-        </p:nvSpPr>
-        <p:spPr/>
-        <p:txBody>
-          <a:bodyPr/>
-          <a:lstStyle/>
-          <a:p>
-            <a:endParaRPr lang="en-US" dirty="0"/>
-          </a:p>
-        </p:txBody>
-      </p:sp>
-      <p:sp>
-        <p:nvSpPr>
-          <p:cNvPr id="4" name="Slide Number Placeholder 3"/>
-          <p:cNvSpPr>
-            <a:spLocks noGrp="1"/>
-          </p:cNvSpPr>
-          <p:nvPr>
-            <p:ph type="sldNum" sz="quarter" idx="10"/>
-          </p:nvPr>
-        </p:nvSpPr>
-        <p:spPr/>
-        <p:txBody>
-          <a:bodyPr/>
-          <a:lstStyle/>
-          <a:p>
-            <a:fld id="{54F66277-1231-2A45-B961-C920BC9B8042}" type="slidenum">
-              <a:rPr lang="en-US" smtClean="0"/>
-              <a:t>7</a:t>
-            </a:fld>
-            <a:endParaRPr lang="en-US"/>
-          </a:p>
-        </p:txBody>
-      </p:sp>
-    </p:spTree>
-    <p:extLst>
-      <p:ext uri="{BB962C8B-B14F-4D97-AF65-F5344CB8AC3E}">
-        <p14:creationId xmlns:p14="http://schemas.microsoft.com/office/powerpoint/2010/main" val="1433922249"/>
-      </p:ext>
-    </p:extLst>
-  </p:cSld>
-  <p:clrMapOvr>
-    <a:masterClrMapping/>
-  </p:clrMapOvr>
-</p:notes>
-</file>
-
 <file path=ppt/slideLayouts/slideLayout1.xml><?xml version="1.0" encoding="utf-8"?>
 <p:sldLayout xmlns:a="http://schemas.openxmlformats.org/drawingml/2006/main" xmlns:r="http://schemas.openxmlformats.org/officeDocument/2006/relationships" xmlns:p="http://schemas.openxmlformats.org/presentationml/2006/main" type="title" preserve="1">
   <p:cSld name="Title Slide">
@@ -772,7 +685,7 @@
           <a:p>
             <a:fld id="{DDADED73-3DFB-7641-B760-2A6E60A49006}" type="datetimeFigureOut">
               <a:rPr lang="en-US" smtClean="0"/>
-              <a:t>12/8/15</a:t>
+              <a:t>12/9/15</a:t>
             </a:fld>
             <a:endParaRPr lang="en-US"/>
           </a:p>
@@ -942,7 +855,7 @@
           <a:p>
             <a:fld id="{DDADED73-3DFB-7641-B760-2A6E60A49006}" type="datetimeFigureOut">
               <a:rPr lang="en-US" smtClean="0"/>
-              <a:t>12/8/15</a:t>
+              <a:t>12/9/15</a:t>
             </a:fld>
             <a:endParaRPr lang="en-US"/>
           </a:p>
@@ -1122,7 +1035,7 @@
           <a:p>
             <a:fld id="{DDADED73-3DFB-7641-B760-2A6E60A49006}" type="datetimeFigureOut">
               <a:rPr lang="en-US" smtClean="0"/>
-              <a:t>12/8/15</a:t>
+              <a:t>12/9/15</a:t>
             </a:fld>
             <a:endParaRPr lang="en-US"/>
           </a:p>
@@ -1292,7 +1205,7 @@
           <a:p>
             <a:fld id="{DDADED73-3DFB-7641-B760-2A6E60A49006}" type="datetimeFigureOut">
               <a:rPr lang="en-US" smtClean="0"/>
-              <a:t>12/8/15</a:t>
+              <a:t>12/9/15</a:t>
             </a:fld>
             <a:endParaRPr lang="en-US"/>
           </a:p>
@@ -1538,7 +1451,7 @@
           <a:p>
             <a:fld id="{DDADED73-3DFB-7641-B760-2A6E60A49006}" type="datetimeFigureOut">
               <a:rPr lang="en-US" smtClean="0"/>
-              <a:t>12/8/15</a:t>
+              <a:t>12/9/15</a:t>
             </a:fld>
             <a:endParaRPr lang="en-US"/>
           </a:p>
@@ -1770,7 +1683,7 @@
           <a:p>
             <a:fld id="{DDADED73-3DFB-7641-B760-2A6E60A49006}" type="datetimeFigureOut">
               <a:rPr lang="en-US" smtClean="0"/>
-              <a:t>12/8/15</a:t>
+              <a:t>12/9/15</a:t>
             </a:fld>
             <a:endParaRPr lang="en-US"/>
           </a:p>
@@ -2137,7 +2050,7 @@
           <a:p>
             <a:fld id="{DDADED73-3DFB-7641-B760-2A6E60A49006}" type="datetimeFigureOut">
               <a:rPr lang="en-US" smtClean="0"/>
-              <a:t>12/8/15</a:t>
+              <a:t>12/9/15</a:t>
             </a:fld>
             <a:endParaRPr lang="en-US"/>
           </a:p>
@@ -2255,7 +2168,7 @@
           <a:p>
             <a:fld id="{DDADED73-3DFB-7641-B760-2A6E60A49006}" type="datetimeFigureOut">
               <a:rPr lang="en-US" smtClean="0"/>
-              <a:t>12/8/15</a:t>
+              <a:t>12/9/15</a:t>
             </a:fld>
             <a:endParaRPr lang="en-US"/>
           </a:p>
@@ -2350,7 +2263,7 @@
           <a:p>
             <a:fld id="{DDADED73-3DFB-7641-B760-2A6E60A49006}" type="datetimeFigureOut">
               <a:rPr lang="en-US" smtClean="0"/>
-              <a:t>12/8/15</a:t>
+              <a:t>12/9/15</a:t>
             </a:fld>
             <a:endParaRPr lang="en-US"/>
           </a:p>
@@ -2627,7 +2540,7 @@
           <a:p>
             <a:fld id="{DDADED73-3DFB-7641-B760-2A6E60A49006}" type="datetimeFigureOut">
               <a:rPr lang="en-US" smtClean="0"/>
-              <a:t>12/8/15</a:t>
+              <a:t>12/9/15</a:t>
             </a:fld>
             <a:endParaRPr lang="en-US"/>
           </a:p>
@@ -2880,7 +2793,7 @@
           <a:p>
             <a:fld id="{DDADED73-3DFB-7641-B760-2A6E60A49006}" type="datetimeFigureOut">
               <a:rPr lang="en-US" smtClean="0"/>
-              <a:t>12/8/15</a:t>
+              <a:t>12/9/15</a:t>
             </a:fld>
             <a:endParaRPr lang="en-US"/>
           </a:p>
@@ -3093,7 +3006,7 @@
           <a:p>
             <a:fld id="{DDADED73-3DFB-7641-B760-2A6E60A49006}" type="datetimeFigureOut">
               <a:rPr lang="en-US" smtClean="0"/>
-              <a:t>12/8/15</a:t>
+              <a:t>12/9/15</a:t>
             </a:fld>
             <a:endParaRPr lang="en-US"/>
           </a:p>
@@ -6515,312 +6428,6 @@
   <p:clrMapOvr>
     <a:masterClrMapping/>
   </p:clrMapOvr>
-</p:sld>
-</file>
-
-<file path=ppt/slides/slide7.xml><?xml version="1.0" encoding="utf-8"?>
-<p:sld xmlns:a="http://schemas.openxmlformats.org/drawingml/2006/main" xmlns:r="http://schemas.openxmlformats.org/officeDocument/2006/relationships" xmlns:p="http://schemas.openxmlformats.org/presentationml/2006/main">
-  <p:cSld>
-    <p:spTree>
-      <p:nvGrpSpPr>
-        <p:cNvPr id="1" name=""/>
-        <p:cNvGrpSpPr/>
-        <p:nvPr/>
-      </p:nvGrpSpPr>
-      <p:grpSpPr>
-        <a:xfrm>
-          <a:off x="0" y="0"/>
-          <a:ext cx="0" cy="0"/>
-          <a:chOff x="0" y="0"/>
-          <a:chExt cx="0" cy="0"/>
-        </a:xfrm>
-      </p:grpSpPr>
-      <p:sp>
-        <p:nvSpPr>
-          <p:cNvPr id="2" name="Title 1"/>
-          <p:cNvSpPr>
-            <a:spLocks noGrp="1"/>
-          </p:cNvSpPr>
-          <p:nvPr>
-            <p:ph type="title"/>
-          </p:nvPr>
-        </p:nvSpPr>
-        <p:spPr>
-          <a:xfrm>
-            <a:off x="838200" y="2242801"/>
-            <a:ext cx="10515600" cy="1325563"/>
-          </a:xfrm>
-        </p:spPr>
-        <p:txBody>
-          <a:bodyPr>
-            <a:normAutofit/>
-          </a:bodyPr>
-          <a:lstStyle/>
-          <a:p>
-            <a:pPr algn="ctr"/>
-            <a:r>
-              <a:rPr lang="en-US" sz="6000" dirty="0" smtClean="0"/>
-              <a:t>Conclusion</a:t>
-            </a:r>
-            <a:endParaRPr lang="en-US" sz="6000" dirty="0"/>
-          </a:p>
-        </p:txBody>
-      </p:sp>
-      <p:sp>
-        <p:nvSpPr>
-          <p:cNvPr id="3" name="Content Placeholder 2"/>
-          <p:cNvSpPr>
-            <a:spLocks noGrp="1"/>
-          </p:cNvSpPr>
-          <p:nvPr>
-            <p:ph idx="1"/>
-          </p:nvPr>
-        </p:nvSpPr>
-        <p:spPr>
-          <a:xfrm>
-            <a:off x="838200" y="3568364"/>
-            <a:ext cx="10515600" cy="2875467"/>
-          </a:xfrm>
-        </p:spPr>
-        <p:txBody>
-          <a:bodyPr>
-            <a:normAutofit/>
-          </a:bodyPr>
-          <a:lstStyle/>
-          <a:p>
-            <a:pPr marL="0" indent="0" algn="ctr">
-              <a:buNone/>
-            </a:pPr>
-            <a:r>
-              <a:rPr lang="en-US" sz="2400" dirty="0" smtClean="0"/>
-              <a:t>What has been the key things we have been able to conclude?</a:t>
-            </a:r>
-            <a:endParaRPr lang="en-US" sz="2400" dirty="0"/>
-          </a:p>
-        </p:txBody>
-      </p:sp>
-    </p:spTree>
-    <p:extLst>
-      <p:ext uri="{BB962C8B-B14F-4D97-AF65-F5344CB8AC3E}">
-        <p14:creationId xmlns:p14="http://schemas.microsoft.com/office/powerpoint/2010/main" val="222417694"/>
-      </p:ext>
-    </p:extLst>
-  </p:cSld>
-  <p:clrMapOvr>
-    <a:masterClrMapping/>
-  </p:clrMapOvr>
-</p:sld>
-</file>
-
-<file path=ppt/slides/slide8.xml><?xml version="1.0" encoding="utf-8"?>
-<p:sld xmlns:a="http://schemas.openxmlformats.org/drawingml/2006/main" xmlns:r="http://schemas.openxmlformats.org/officeDocument/2006/relationships" xmlns:p="http://schemas.openxmlformats.org/presentationml/2006/main">
-  <p:cSld>
-    <p:spTree>
-      <p:nvGrpSpPr>
-        <p:cNvPr id="1" name=""/>
-        <p:cNvGrpSpPr/>
-        <p:nvPr/>
-      </p:nvGrpSpPr>
-      <p:grpSpPr>
-        <a:xfrm>
-          <a:off x="0" y="0"/>
-          <a:ext cx="0" cy="0"/>
-          <a:chOff x="0" y="0"/>
-          <a:chExt cx="0" cy="0"/>
-        </a:xfrm>
-      </p:grpSpPr>
-      <p:sp>
-        <p:nvSpPr>
-          <p:cNvPr id="2" name="Title 1"/>
-          <p:cNvSpPr>
-            <a:spLocks noGrp="1"/>
-          </p:cNvSpPr>
-          <p:nvPr>
-            <p:ph type="title"/>
-          </p:nvPr>
-        </p:nvSpPr>
-        <p:spPr/>
-        <p:txBody>
-          <a:bodyPr/>
-          <a:lstStyle/>
-          <a:p>
-            <a:r>
-              <a:rPr lang="en-US" dirty="0" smtClean="0"/>
-              <a:t>The evolution of our question</a:t>
-            </a:r>
-            <a:endParaRPr lang="en-US" dirty="0"/>
-          </a:p>
-        </p:txBody>
-      </p:sp>
-      <p:sp>
-        <p:nvSpPr>
-          <p:cNvPr id="3" name="Content Placeholder 2"/>
-          <p:cNvSpPr>
-            <a:spLocks noGrp="1"/>
-          </p:cNvSpPr>
-          <p:nvPr>
-            <p:ph idx="1"/>
-          </p:nvPr>
-        </p:nvSpPr>
-        <p:spPr/>
-        <p:txBody>
-          <a:bodyPr/>
-          <a:lstStyle/>
-          <a:p>
-            <a:pPr lvl="1"/>
-            <a:r>
-              <a:rPr lang="en-US" dirty="0" smtClean="0"/>
-              <a:t>At First</a:t>
-            </a:r>
-          </a:p>
-          <a:p>
-            <a:pPr lvl="2"/>
-            <a:r>
-              <a:rPr lang="en-US" dirty="0"/>
-              <a:t>We wanted to see if political contributions by industries to specific candidates had any bearing on election results </a:t>
-            </a:r>
-          </a:p>
-          <a:p>
-            <a:pPr lvl="2"/>
-            <a:r>
-              <a:rPr lang="en-US" dirty="0"/>
-              <a:t>We also wanted to see if the election results had any specific impact on the market as a whole. </a:t>
-            </a:r>
-          </a:p>
-          <a:p>
-            <a:pPr lvl="1"/>
-            <a:endParaRPr lang="en-US" dirty="0"/>
-          </a:p>
-          <a:p>
-            <a:pPr lvl="1"/>
-            <a:r>
-              <a:rPr lang="en-US" dirty="0" smtClean="0"/>
-              <a:t>After Part 2</a:t>
-            </a:r>
-          </a:p>
-          <a:p>
-            <a:pPr lvl="2"/>
-            <a:r>
-              <a:rPr lang="en-US" dirty="0" smtClean="0"/>
-              <a:t>The idea morphed into looking at total campaign contributions and other aspects that led to candidates winning</a:t>
-            </a:r>
-          </a:p>
-        </p:txBody>
-      </p:sp>
-    </p:spTree>
-    <p:extLst>
-      <p:ext uri="{BB962C8B-B14F-4D97-AF65-F5344CB8AC3E}">
-        <p14:creationId xmlns:p14="http://schemas.microsoft.com/office/powerpoint/2010/main" val="1579589077"/>
-      </p:ext>
-    </p:extLst>
-  </p:cSld>
-  <p:clrMapOvr>
-    <a:masterClrMapping/>
-  </p:clrMapOvr>
-  <p:timing>
-    <p:tnLst>
-      <p:par>
-        <p:cTn id="1" dur="indefinite" restart="never" nodeType="tmRoot"/>
-      </p:par>
-    </p:tnLst>
-  </p:timing>
-</p:sld>
-</file>
-
-<file path=ppt/slides/slide9.xml><?xml version="1.0" encoding="utf-8"?>
-<p:sld xmlns:a="http://schemas.openxmlformats.org/drawingml/2006/main" xmlns:r="http://schemas.openxmlformats.org/officeDocument/2006/relationships" xmlns:p="http://schemas.openxmlformats.org/presentationml/2006/main">
-  <p:cSld>
-    <p:spTree>
-      <p:nvGrpSpPr>
-        <p:cNvPr id="1" name=""/>
-        <p:cNvGrpSpPr/>
-        <p:nvPr/>
-      </p:nvGrpSpPr>
-      <p:grpSpPr>
-        <a:xfrm>
-          <a:off x="0" y="0"/>
-          <a:ext cx="0" cy="0"/>
-          <a:chOff x="0" y="0"/>
-          <a:chExt cx="0" cy="0"/>
-        </a:xfrm>
-      </p:grpSpPr>
-      <p:sp>
-        <p:nvSpPr>
-          <p:cNvPr id="2" name="Title 1"/>
-          <p:cNvSpPr>
-            <a:spLocks noGrp="1"/>
-          </p:cNvSpPr>
-          <p:nvPr>
-            <p:ph type="title"/>
-          </p:nvPr>
-        </p:nvSpPr>
-        <p:spPr/>
-        <p:txBody>
-          <a:bodyPr/>
-          <a:lstStyle/>
-          <a:p>
-            <a:r>
-              <a:rPr lang="en-US" dirty="0" smtClean="0"/>
-              <a:t>Some takeaways</a:t>
-            </a:r>
-            <a:endParaRPr lang="en-US" dirty="0"/>
-          </a:p>
-        </p:txBody>
-      </p:sp>
-      <p:sp>
-        <p:nvSpPr>
-          <p:cNvPr id="3" name="Content Placeholder 2"/>
-          <p:cNvSpPr>
-            <a:spLocks noGrp="1"/>
-          </p:cNvSpPr>
-          <p:nvPr>
-            <p:ph idx="1"/>
-          </p:nvPr>
-        </p:nvSpPr>
-        <p:spPr/>
-        <p:txBody>
-          <a:bodyPr/>
-          <a:lstStyle/>
-          <a:p>
-            <a:r>
-              <a:rPr lang="en-US" dirty="0" smtClean="0"/>
-              <a:t>Many of our conclusions supported already expected conclusions, but no major breakthroughs that we we were hopping for</a:t>
-            </a:r>
-          </a:p>
-          <a:p>
-            <a:r>
-              <a:rPr lang="en-US" dirty="0" smtClean="0"/>
-              <a:t>Stocks aren’t significantly affected by election results</a:t>
-            </a:r>
-          </a:p>
-          <a:p>
-            <a:r>
-              <a:rPr lang="en-US"/>
-              <a:t>If you’re running for congress, make sure to be an incumbent</a:t>
-            </a:r>
-          </a:p>
-          <a:p>
-            <a:endParaRPr lang="en-US" dirty="0"/>
-          </a:p>
-        </p:txBody>
-      </p:sp>
-    </p:spTree>
-    <p:extLst>
-      <p:ext uri="{BB962C8B-B14F-4D97-AF65-F5344CB8AC3E}">
-        <p14:creationId xmlns:p14="http://schemas.microsoft.com/office/powerpoint/2010/main" val="895814102"/>
-      </p:ext>
-    </p:extLst>
-  </p:cSld>
-  <p:clrMapOvr>
-    <a:masterClrMapping/>
-  </p:clrMapOvr>
-  <p:timing>
-    <p:tnLst>
-      <p:par>
-        <p:cTn id="1" dur="indefinite" restart="never" nodeType="tmRoot"/>
-      </p:par>
-    </p:tnLst>
-  </p:timing>
 </p:sld>
 </file>
 

</xml_diff>